<commit_message>
updates to DG for rec
</commit_message>
<xml_diff>
--- a/docs/diagrams/RecCommandSequenceDiagram.pptx
+++ b/docs/diagrams/RecCommandSequenceDiagram.pptx
@@ -289,7 +289,7 @@
             <a:fld id="{81FCF6FD-AAF1-4CFD-94AC-E8B644795DCE}" type="datetimeFigureOut">
               <a:rPr lang="en-SG" smtClean="0"/>
               <a:pPr/>
-              <a:t>9/4/2019</a:t>
+              <a:t>10/4/2019</a:t>
             </a:fld>
             <a:endParaRPr lang="en-SG" dirty="0"/>
           </a:p>
@@ -456,7 +456,7 @@
             <a:fld id="{81FCF6FD-AAF1-4CFD-94AC-E8B644795DCE}" type="datetimeFigureOut">
               <a:rPr lang="en-SG" smtClean="0"/>
               <a:pPr/>
-              <a:t>9/4/2019</a:t>
+              <a:t>10/4/2019</a:t>
             </a:fld>
             <a:endParaRPr lang="en-SG" dirty="0"/>
           </a:p>
@@ -633,7 +633,7 @@
             <a:fld id="{81FCF6FD-AAF1-4CFD-94AC-E8B644795DCE}" type="datetimeFigureOut">
               <a:rPr lang="en-SG" smtClean="0"/>
               <a:pPr/>
-              <a:t>9/4/2019</a:t>
+              <a:t>10/4/2019</a:t>
             </a:fld>
             <a:endParaRPr lang="en-SG" dirty="0"/>
           </a:p>
@@ -800,7 +800,7 @@
             <a:fld id="{81FCF6FD-AAF1-4CFD-94AC-E8B644795DCE}" type="datetimeFigureOut">
               <a:rPr lang="en-SG" smtClean="0"/>
               <a:pPr/>
-              <a:t>9/4/2019</a:t>
+              <a:t>10/4/2019</a:t>
             </a:fld>
             <a:endParaRPr lang="en-SG" dirty="0"/>
           </a:p>
@@ -1043,7 +1043,7 @@
             <a:fld id="{81FCF6FD-AAF1-4CFD-94AC-E8B644795DCE}" type="datetimeFigureOut">
               <a:rPr lang="en-SG" smtClean="0"/>
               <a:pPr/>
-              <a:t>9/4/2019</a:t>
+              <a:t>10/4/2019</a:t>
             </a:fld>
             <a:endParaRPr lang="en-SG" dirty="0"/>
           </a:p>
@@ -1328,7 +1328,7 @@
             <a:fld id="{81FCF6FD-AAF1-4CFD-94AC-E8B644795DCE}" type="datetimeFigureOut">
               <a:rPr lang="en-SG" smtClean="0"/>
               <a:pPr/>
-              <a:t>9/4/2019</a:t>
+              <a:t>10/4/2019</a:t>
             </a:fld>
             <a:endParaRPr lang="en-SG" dirty="0"/>
           </a:p>
@@ -1747,7 +1747,7 @@
             <a:fld id="{81FCF6FD-AAF1-4CFD-94AC-E8B644795DCE}" type="datetimeFigureOut">
               <a:rPr lang="en-SG" smtClean="0"/>
               <a:pPr/>
-              <a:t>9/4/2019</a:t>
+              <a:t>10/4/2019</a:t>
             </a:fld>
             <a:endParaRPr lang="en-SG" dirty="0"/>
           </a:p>
@@ -1862,7 +1862,7 @@
             <a:fld id="{81FCF6FD-AAF1-4CFD-94AC-E8B644795DCE}" type="datetimeFigureOut">
               <a:rPr lang="en-SG" smtClean="0"/>
               <a:pPr/>
-              <a:t>9/4/2019</a:t>
+              <a:t>10/4/2019</a:t>
             </a:fld>
             <a:endParaRPr lang="en-SG" dirty="0"/>
           </a:p>
@@ -1954,7 +1954,7 @@
             <a:fld id="{81FCF6FD-AAF1-4CFD-94AC-E8B644795DCE}" type="datetimeFigureOut">
               <a:rPr lang="en-SG" smtClean="0"/>
               <a:pPr/>
-              <a:t>9/4/2019</a:t>
+              <a:t>10/4/2019</a:t>
             </a:fld>
             <a:endParaRPr lang="en-SG" dirty="0"/>
           </a:p>
@@ -2228,7 +2228,7 @@
             <a:fld id="{81FCF6FD-AAF1-4CFD-94AC-E8B644795DCE}" type="datetimeFigureOut">
               <a:rPr lang="en-SG" smtClean="0"/>
               <a:pPr/>
-              <a:t>9/4/2019</a:t>
+              <a:t>10/4/2019</a:t>
             </a:fld>
             <a:endParaRPr lang="en-SG" dirty="0"/>
           </a:p>
@@ -2478,7 +2478,7 @@
             <a:fld id="{81FCF6FD-AAF1-4CFD-94AC-E8B644795DCE}" type="datetimeFigureOut">
               <a:rPr lang="en-SG" smtClean="0"/>
               <a:pPr/>
-              <a:t>9/4/2019</a:t>
+              <a:t>10/4/2019</a:t>
             </a:fld>
             <a:endParaRPr lang="en-SG" dirty="0"/>
           </a:p>
@@ -2688,7 +2688,7 @@
             <a:fld id="{81FCF6FD-AAF1-4CFD-94AC-E8B644795DCE}" type="datetimeFigureOut">
               <a:rPr lang="en-SG" smtClean="0"/>
               <a:pPr/>
-              <a:t>9/4/2019</a:t>
+              <a:t>10/4/2019</a:t>
             </a:fld>
             <a:endParaRPr lang="en-SG" dirty="0"/>
           </a:p>
@@ -3334,8 +3334,8 @@
         </p:nvSpPr>
         <p:spPr>
           <a:xfrm>
-            <a:off x="2555776" y="484329"/>
-            <a:ext cx="1566860" cy="467684"/>
+            <a:off x="2555776" y="620688"/>
+            <a:ext cx="1566860" cy="331324"/>
           </a:xfrm>
           <a:prstGeom prst="rect">
             <a:avLst/>
@@ -3481,7 +3481,6 @@
           <p:cNvCxnSpPr>
             <a:cxnSpLocks/>
             <a:stCxn id="13" idx="0"/>
-            <a:endCxn id="33" idx="0"/>
           </p:cNvCxnSpPr>
           <p:nvPr/>
         </p:nvCxnSpPr>
@@ -4236,12 +4235,12 @@
           <a:p>
             <a:pPr algn="ctr"/>
             <a:r>
-              <a:rPr lang="en-US" sz="1600" dirty="0">
+              <a:rPr lang="en-US" sz="1600" dirty="0" smtClean="0">
                 <a:solidFill>
                   <a:schemeClr val="bg1"/>
                 </a:solidFill>
               </a:rPr>
-              <a:t>: Model</a:t>
+              <a:t>:Model</a:t>
             </a:r>
             <a:endParaRPr lang="en-SG" sz="1600" dirty="0">
               <a:solidFill>
@@ -4334,39 +4333,6 @@
           <a:p>
             <a:pPr algn="ctr"/>
             <a:endParaRPr lang="en-SG" sz="1400" dirty="0"/>
-          </a:p>
-        </p:txBody>
-      </p:sp>
-      <p:sp>
-        <p:nvSpPr>
-          <p:cNvPr id="33" name="TextBox 32"/>
-          <p:cNvSpPr txBox="1"/>
-          <p:nvPr/>
-        </p:nvSpPr>
-        <p:spPr>
-          <a:xfrm>
-            <a:off x="5076056" y="7101408"/>
-            <a:ext cx="277640" cy="307777"/>
-          </a:xfrm>
-          <a:prstGeom prst="rect">
-            <a:avLst/>
-          </a:prstGeom>
-          <a:noFill/>
-        </p:spPr>
-        <p:txBody>
-          <a:bodyPr wrap="none" rtlCol="0">
-            <a:spAutoFit/>
-          </a:bodyPr>
-          <a:lstStyle/>
-          <a:p>
-            <a:r>
-              <a:rPr lang="en-SG" sz="1400" dirty="0">
-                <a:solidFill>
-                  <a:srgbClr val="002060"/>
-                </a:solidFill>
-              </a:rPr>
-              <a:t>X</a:t>
-            </a:r>
           </a:p>
         </p:txBody>
       </p:sp>
@@ -5014,20 +4980,12 @@
           <a:p>
             <a:pPr algn="ctr"/>
             <a:r>
-              <a:rPr lang="en-US" sz="1600" dirty="0">
+              <a:rPr lang="en-US" sz="1600" dirty="0" smtClean="0">
                 <a:solidFill>
                   <a:schemeClr val="bg1"/>
                 </a:solidFill>
               </a:rPr>
-              <a:t>: </a:t>
-            </a:r>
-            <a:r>
-              <a:rPr lang="en-US" sz="1600" dirty="0" smtClean="0">
-                <a:solidFill>
-                  <a:schemeClr val="bg1"/>
-                </a:solidFill>
-              </a:rPr>
-              <a:t>FilteredList</a:t>
+              <a:t>:FilteredList</a:t>
             </a:r>
           </a:p>
           <a:p>
@@ -5092,20 +5050,12 @@
           <a:p>
             <a:pPr algn="ctr"/>
             <a:r>
-              <a:rPr lang="en-US" sz="1600" dirty="0">
+              <a:rPr lang="en-US" sz="1600" dirty="0" smtClean="0">
                 <a:solidFill>
                   <a:schemeClr val="bg1"/>
                 </a:solidFill>
               </a:rPr>
-              <a:t>: </a:t>
-            </a:r>
-            <a:r>
-              <a:rPr lang="en-US" sz="1600" dirty="0" smtClean="0">
-                <a:solidFill>
-                  <a:schemeClr val="bg1"/>
-                </a:solidFill>
-              </a:rPr>
-              <a:t>SortedList</a:t>
+              <a:t>:SortedList</a:t>
             </a:r>
           </a:p>
           <a:p>
@@ -5137,7 +5087,7 @@
         <p:spPr>
           <a:xfrm>
             <a:off x="10249999" y="2852936"/>
-            <a:ext cx="10633" cy="4464496"/>
+            <a:ext cx="10633" cy="1944216"/>
           </a:xfrm>
           <a:prstGeom prst="line">
             <a:avLst/>
@@ -5619,7 +5569,7 @@
         <p:spPr>
           <a:xfrm>
             <a:off x="12770279" y="2852936"/>
-            <a:ext cx="10633" cy="4464496"/>
+            <a:ext cx="10633" cy="3816424"/>
           </a:xfrm>
           <a:prstGeom prst="line">
             <a:avLst/>
@@ -5749,7 +5699,7 @@
         <p:spPr>
           <a:xfrm flipH="1">
             <a:off x="11268744" y="5483746"/>
-            <a:ext cx="21268" cy="1185614"/>
+            <a:ext cx="21268" cy="1257622"/>
           </a:xfrm>
           <a:prstGeom prst="line">
             <a:avLst/>
@@ -5947,7 +5897,7 @@
         </p:nvSpPr>
         <p:spPr>
           <a:xfrm>
-            <a:off x="8481698" y="6762634"/>
+            <a:off x="8485295" y="6669360"/>
             <a:ext cx="324544" cy="215444"/>
           </a:xfrm>
           <a:prstGeom prst="rect">
@@ -6002,7 +5952,7 @@
         </p:nvSpPr>
         <p:spPr>
           <a:xfrm>
-            <a:off x="11016208" y="6669360"/>
+            <a:off x="11005575" y="6667517"/>
             <a:ext cx="324544" cy="215444"/>
           </a:xfrm>
           <a:prstGeom prst="rect">
@@ -6095,6 +6045,53 @@
                 <a:srgbClr val="7030A0"/>
               </a:solidFill>
             </a:endParaRPr>
+          </a:p>
+        </p:txBody>
+      </p:sp>
+      <p:sp>
+        <p:nvSpPr>
+          <p:cNvPr id="66" name="TextBox 65">
+            <a:extLst>
+              <a:ext uri="{FF2B5EF4-FFF2-40B4-BE49-F238E27FC236}">
+                <a16:creationId xmlns:a16="http://schemas.microsoft.com/office/drawing/2014/main" xmlns="" id="{B85C6184-7378-4E89-A338-72B1E5056F4F}"/>
+              </a:ext>
+            </a:extLst>
+          </p:cNvPr>
+          <p:cNvSpPr txBox="1"/>
+          <p:nvPr/>
+        </p:nvSpPr>
+        <p:spPr>
+          <a:xfrm>
+            <a:off x="4932040" y="7037610"/>
+            <a:ext cx="324544" cy="215444"/>
+          </a:xfrm>
+          <a:prstGeom prst="rect">
+            <a:avLst/>
+          </a:prstGeom>
+          <a:noFill/>
+        </p:spPr>
+        <p:txBody>
+          <a:bodyPr wrap="square" lIns="0" tIns="0" rIns="0" bIns="0" rtlCol="0">
+            <a:spAutoFit/>
+          </a:bodyPr>
+          <a:lstStyle>
+            <a:defPPr>
+              <a:defRPr lang="en-US"/>
+            </a:defPPr>
+            <a:lvl1pPr algn="r">
+              <a:defRPr sz="1400">
+                <a:solidFill>
+                  <a:srgbClr val="0070C0"/>
+                </a:solidFill>
+              </a:defRPr>
+            </a:lvl1pPr>
+          </a:lstStyle>
+          <a:p>
+            <a:r>
+              <a:rPr lang="en-US" dirty="0" smtClean="0"/>
+              <a:t>X</a:t>
+            </a:r>
+            <a:endParaRPr lang="en-US" dirty="0"/>
           </a:p>
         </p:txBody>
       </p:sp>

</xml_diff>